<commit_message>
Updated presentation based on VK's feedback.
</commit_message>
<xml_diff>
--- a/BDD.pptx
+++ b/BDD.pptx
@@ -6,10 +6,10 @@
     <p:sldMasterId id="2147483697" r:id="rId7"/>
   </p:sldMasterIdLst>
   <p:notesMasterIdLst>
-    <p:notesMasterId r:id="rId20"/>
+    <p:notesMasterId r:id="rId21"/>
   </p:notesMasterIdLst>
   <p:handoutMasterIdLst>
-    <p:handoutMasterId r:id="rId21"/>
+    <p:handoutMasterId r:id="rId22"/>
   </p:handoutMasterIdLst>
   <p:sldIdLst>
     <p:sldId id="264" r:id="rId8"/>
@@ -23,7 +23,8 @@
     <p:sldId id="272" r:id="rId16"/>
     <p:sldId id="273" r:id="rId17"/>
     <p:sldId id="274" r:id="rId18"/>
-    <p:sldId id="275" r:id="rId19"/>
+    <p:sldId id="276" r:id="rId19"/>
+    <p:sldId id="275" r:id="rId20"/>
   </p:sldIdLst>
   <p:sldSz cx="9144000" cy="6858000" type="screen4x3"/>
   <p:notesSz cx="7010400" cy="9296400"/>
@@ -165,10 +166,163 @@
 
 <file path=ppt/commentAuthors.xml><?xml version="1.0" encoding="utf-8"?>
 <p:cmAuthorLst xmlns:a="http://schemas.openxmlformats.org/drawingml/2006/main" xmlns:r="http://schemas.openxmlformats.org/officeDocument/2006/relationships" xmlns:p="http://schemas.openxmlformats.org/presentationml/2006/main">
+  <p:cmAuthor id="7" name="Microsoft Office User" initials="Office [5]" lastIdx="1" clrIdx="6">
+    <p:extLst>
+      <p:ext uri="{19B8F6BF-5375-455C-9EA6-DF929625EA0E}">
+        <p15:presenceInfo xmlns:p15="http://schemas.microsoft.com/office/powerpoint/2012/main" userId="" providerId=""/>
+      </p:ext>
+    </p:extLst>
+  </p:cmAuthor>
   <p:cmAuthor id="1" name="Russell Holman" initials="RH" lastIdx="2" clrIdx="0">
     <p:extLst/>
   </p:cmAuthor>
+  <p:cmAuthor id="2" name="Vijaya Kokkili" initials="VK" lastIdx="6" clrIdx="1">
+    <p:extLst/>
+  </p:cmAuthor>
+  <p:cmAuthor id="3" name="Microsoft Office User" initials="Office" lastIdx="1" clrIdx="2">
+    <p:extLst>
+      <p:ext uri="{19B8F6BF-5375-455C-9EA6-DF929625EA0E}">
+        <p15:presenceInfo xmlns:p15="http://schemas.microsoft.com/office/powerpoint/2012/main" userId="" providerId=""/>
+      </p:ext>
+    </p:extLst>
+  </p:cmAuthor>
+  <p:cmAuthor id="4" name="Microsoft Office User" initials="Office [2]" lastIdx="1" clrIdx="3">
+    <p:extLst>
+      <p:ext uri="{19B8F6BF-5375-455C-9EA6-DF929625EA0E}">
+        <p15:presenceInfo xmlns:p15="http://schemas.microsoft.com/office/powerpoint/2012/main" userId="" providerId=""/>
+      </p:ext>
+    </p:extLst>
+  </p:cmAuthor>
+  <p:cmAuthor id="5" name="Microsoft Office User" initials="Office [3]" lastIdx="1" clrIdx="4">
+    <p:extLst>
+      <p:ext uri="{19B8F6BF-5375-455C-9EA6-DF929625EA0E}">
+        <p15:presenceInfo xmlns:p15="http://schemas.microsoft.com/office/powerpoint/2012/main" userId="" providerId=""/>
+      </p:ext>
+    </p:extLst>
+  </p:cmAuthor>
+  <p:cmAuthor id="6" name="Microsoft Office User" initials="Office [4]" lastIdx="1" clrIdx="5">
+    <p:extLst>
+      <p:ext uri="{19B8F6BF-5375-455C-9EA6-DF929625EA0E}">
+        <p15:presenceInfo xmlns:p15="http://schemas.microsoft.com/office/powerpoint/2012/main" userId="" providerId=""/>
+      </p:ext>
+    </p:extLst>
+  </p:cmAuthor>
 </p:cmAuthorLst>
+</file>
+
+<file path=ppt/comments/comment1.xml><?xml version="1.0" encoding="utf-8"?>
+<p:cmLst xmlns:a="http://schemas.openxmlformats.org/drawingml/2006/main" xmlns:r="http://schemas.openxmlformats.org/officeDocument/2006/relationships" xmlns:p="http://schemas.openxmlformats.org/presentationml/2006/main">
+  <p:cm authorId="2" dt="2016-06-09T11:48:54.012" idx="3">
+    <p:pos x="5060" y="1163"/>
+    <p:text>typo</p:text>
+    <p:extLst>
+      <p:ext uri="{C676402C-5697-4E1C-873F-D02D1690AC5C}">
+        <p15:threadingInfo xmlns:p15="http://schemas.microsoft.com/office/powerpoint/2012/main" timeZoneBias="240"/>
+      </p:ext>
+    </p:extLst>
+  </p:cm>
+  <p:cm authorId="5" dt="2016-06-09T13:10:50.357" idx="1">
+    <p:pos x="5060" y="1259"/>
+    <p:text>fix'd</p:text>
+    <p:extLst>
+      <p:ext uri="{C676402C-5697-4E1C-873F-D02D1690AC5C}">
+        <p15:threadingInfo xmlns:p15="http://schemas.microsoft.com/office/powerpoint/2012/main" timeZoneBias="240">
+          <p15:parentCm authorId="2" idx="3"/>
+        </p15:threadingInfo>
+      </p:ext>
+    </p:extLst>
+  </p:cm>
+  <p:cm authorId="2" dt="2016-06-09T11:50:11.831" idx="5">
+    <p:pos x="655" y="994"/>
+    <p:text>Talk about what the common reasons for projects to fail. requirements changing often, miscommunication, incorrect test written, not understanding business usage of software...</p:text>
+    <p:extLst>
+      <p:ext uri="{C676402C-5697-4E1C-873F-D02D1690AC5C}">
+        <p15:threadingInfo xmlns:p15="http://schemas.microsoft.com/office/powerpoint/2012/main" timeZoneBias="240"/>
+      </p:ext>
+    </p:extLst>
+  </p:cm>
+  <p:cm authorId="7" dt="2016-06-09T13:28:44.197" idx="1">
+    <p:pos x="655" y="1090"/>
+    <p:text>Re-worded some stuff in the slide, but these points will definitely be called out in the presentation.</p:text>
+    <p:extLst>
+      <p:ext uri="{C676402C-5697-4E1C-873F-D02D1690AC5C}">
+        <p15:threadingInfo xmlns:p15="http://schemas.microsoft.com/office/powerpoint/2012/main" timeZoneBias="240">
+          <p15:parentCm authorId="2" idx="5"/>
+        </p15:threadingInfo>
+      </p:ext>
+    </p:extLst>
+  </p:cm>
+</p:cmLst>
+</file>
+
+<file path=ppt/comments/comment2.xml><?xml version="1.0" encoding="utf-8"?>
+<p:cmLst xmlns:a="http://schemas.openxmlformats.org/drawingml/2006/main" xmlns:r="http://schemas.openxmlformats.org/officeDocument/2006/relationships" xmlns:p="http://schemas.openxmlformats.org/presentationml/2006/main">
+  <p:cm authorId="2" dt="2016-06-09T11:49:20.839" idx="4">
+    <p:pos x="2016" y="1954"/>
+    <p:text>probably worth mentioning Gherkin language here?</p:text>
+    <p:extLst>
+      <p:ext uri="{C676402C-5697-4E1C-873F-D02D1690AC5C}">
+        <p15:threadingInfo xmlns:p15="http://schemas.microsoft.com/office/powerpoint/2012/main" timeZoneBias="240"/>
+      </p:ext>
+    </p:extLst>
+  </p:cm>
+  <p:cm authorId="6" dt="2016-06-09T13:26:25.682" idx="1">
+    <p:pos x="2016" y="2050"/>
+    <p:text>Added</p:text>
+    <p:extLst>
+      <p:ext uri="{C676402C-5697-4E1C-873F-D02D1690AC5C}">
+        <p15:threadingInfo xmlns:p15="http://schemas.microsoft.com/office/powerpoint/2012/main" timeZoneBias="240">
+          <p15:parentCm authorId="2" idx="4"/>
+        </p15:threadingInfo>
+      </p:ext>
+    </p:extLst>
+  </p:cm>
+</p:cmLst>
+</file>
+
+<file path=ppt/comments/comment3.xml><?xml version="1.0" encoding="utf-8"?>
+<p:cmLst xmlns:a="http://schemas.openxmlformats.org/drawingml/2006/main" xmlns:r="http://schemas.openxmlformats.org/officeDocument/2006/relationships" xmlns:p="http://schemas.openxmlformats.org/presentationml/2006/main">
+  <p:cm authorId="2" dt="2016-06-09T11:47:05.598" idx="1">
+    <p:pos x="3925" y="2214"/>
+    <p:text>Also, since BDD depends on precise requirements, a system which depends on too many variables, will not result in a readable test</p:text>
+    <p:extLst>
+      <p:ext uri="{C676402C-5697-4E1C-873F-D02D1690AC5C}">
+        <p15:threadingInfo xmlns:p15="http://schemas.microsoft.com/office/powerpoint/2012/main" timeZoneBias="240"/>
+      </p:ext>
+    </p:extLst>
+  </p:cm>
+  <p:cm authorId="3" dt="2016-06-09T13:10:07.529" idx="1">
+    <p:pos x="3925" y="2310"/>
+    <p:text>Added.</p:text>
+    <p:extLst>
+      <p:ext uri="{C676402C-5697-4E1C-873F-D02D1690AC5C}">
+        <p15:threadingInfo xmlns:p15="http://schemas.microsoft.com/office/powerpoint/2012/main" timeZoneBias="240">
+          <p15:parentCm authorId="2" idx="1"/>
+        </p15:threadingInfo>
+      </p:ext>
+    </p:extLst>
+  </p:cm>
+  <p:cm authorId="2" dt="2016-06-09T11:53:13.682" idx="6">
+    <p:pos x="627" y="887"/>
+    <p:text>Talk about pros of BDD: encourages clear communication between stakeholders, requirements are vetted to granual level upfront, immideate feedback upfront, working on feature level</p:text>
+    <p:extLst>
+      <p:ext uri="{C676402C-5697-4E1C-873F-D02D1690AC5C}">
+        <p15:threadingInfo xmlns:p15="http://schemas.microsoft.com/office/powerpoint/2012/main" timeZoneBias="240"/>
+      </p:ext>
+    </p:extLst>
+  </p:cm>
+  <p:cm authorId="4" dt="2016-06-09T13:10:28.691" idx="1">
+    <p:pos x="627" y="983"/>
+    <p:text>Added slide for the pros of using BDD</p:text>
+    <p:extLst>
+      <p:ext uri="{C676402C-5697-4E1C-873F-D02D1690AC5C}">
+        <p15:threadingInfo xmlns:p15="http://schemas.microsoft.com/office/powerpoint/2012/main" timeZoneBias="240">
+          <p15:parentCm authorId="2" idx="6"/>
+        </p15:threadingInfo>
+      </p:ext>
+    </p:extLst>
+  </p:cm>
+</p:cmLst>
 </file>
 
 <file path=ppt/handoutMasters/handoutMaster1.xml><?xml version="1.0" encoding="utf-8"?>
@@ -3478,8 +3632,23 @@
             </a:pPr>
             <a:r>
               <a:rPr lang="en-US" dirty="0" smtClean="0"/>
-              <a:t>It can be hard to adapt a legacy application to use BDD due to the effort 	required to translate requirements into feature files.</a:t>
-            </a:r>
+              <a:t>It can be hard to adapt a legacy application to use BDD due to the effort 	required to translate requirements into feature files</a:t>
+            </a:r>
+            <a:r>
+              <a:rPr lang="en-US" dirty="0" smtClean="0"/>
+              <a:t>.</a:t>
+            </a:r>
+          </a:p>
+          <a:p>
+            <a:pPr marL="285750" indent="-285750">
+              <a:buFont typeface="Arial" charset="0"/>
+              <a:buChar char="•"/>
+            </a:pPr>
+            <a:r>
+              <a:rPr lang="en-US" dirty="0" smtClean="0"/>
+              <a:t>Due to the format in which BDD features are written, systems that require 	extensive configuration may result in unmanageable feature files.</a:t>
+            </a:r>
+            <a:endParaRPr lang="en-US" dirty="0" smtClean="0"/>
           </a:p>
           <a:p>
             <a:pPr marL="285750" indent="-285750">
@@ -3511,6 +3680,143 @@
 </file>
 
 <file path=ppt/slides/slide12.xml><?xml version="1.0" encoding="utf-8"?>
+<p:sld xmlns:a="http://schemas.openxmlformats.org/drawingml/2006/main" xmlns:r="http://schemas.openxmlformats.org/officeDocument/2006/relationships" xmlns:p="http://schemas.openxmlformats.org/presentationml/2006/main">
+  <p:cSld>
+    <p:spTree>
+      <p:nvGrpSpPr>
+        <p:cNvPr id="1" name=""/>
+        <p:cNvGrpSpPr/>
+        <p:nvPr/>
+      </p:nvGrpSpPr>
+      <p:grpSpPr>
+        <a:xfrm>
+          <a:off x="0" y="0"/>
+          <a:ext cx="0" cy="0"/>
+          <a:chOff x="0" y="0"/>
+          <a:chExt cx="0" cy="0"/>
+        </a:xfrm>
+      </p:grpSpPr>
+      <p:sp>
+        <p:nvSpPr>
+          <p:cNvPr id="2" name="Title 1"/>
+          <p:cNvSpPr>
+            <a:spLocks noGrp="1"/>
+          </p:cNvSpPr>
+          <p:nvPr>
+            <p:ph type="title"/>
+          </p:nvPr>
+        </p:nvSpPr>
+        <p:spPr/>
+        <p:txBody>
+          <a:bodyPr/>
+          <a:lstStyle/>
+          <a:p>
+            <a:r>
+              <a:rPr lang="en-US" dirty="0" smtClean="0"/>
+              <a:t>Benefits of BDD</a:t>
+            </a:r>
+            <a:endParaRPr lang="en-US" dirty="0"/>
+          </a:p>
+        </p:txBody>
+      </p:sp>
+      <p:sp>
+        <p:nvSpPr>
+          <p:cNvPr id="3" name="Text Placeholder 2"/>
+          <p:cNvSpPr>
+            <a:spLocks noGrp="1"/>
+          </p:cNvSpPr>
+          <p:nvPr>
+            <p:ph type="body" sz="quarter" idx="12"/>
+          </p:nvPr>
+        </p:nvSpPr>
+        <p:spPr>
+          <a:xfrm>
+            <a:off x="457200" y="1366179"/>
+            <a:ext cx="8229600" cy="4827791"/>
+          </a:xfrm>
+        </p:spPr>
+        <p:txBody>
+          <a:bodyPr/>
+          <a:lstStyle/>
+          <a:p>
+            <a:pPr marL="285750" indent="-285750">
+              <a:buFont typeface="Arial" charset="0"/>
+              <a:buChar char="•"/>
+            </a:pPr>
+            <a:r>
+              <a:rPr lang="en-US" dirty="0" smtClean="0"/>
+              <a:t>Requirements are analyzed very carefully throughout the project.</a:t>
+            </a:r>
+          </a:p>
+          <a:p>
+            <a:pPr marL="285750" indent="-285750">
+              <a:buFont typeface="Arial" charset="0"/>
+              <a:buChar char="•"/>
+            </a:pPr>
+            <a:r>
+              <a:rPr lang="en-US" dirty="0" smtClean="0"/>
+              <a:t>Application features are built to meet the requirements. </a:t>
+            </a:r>
+          </a:p>
+          <a:p>
+            <a:pPr marL="1028700" lvl="1">
+              <a:buFont typeface="Arial" charset="0"/>
+              <a:buChar char="•"/>
+            </a:pPr>
+            <a:r>
+              <a:rPr lang="en-US" dirty="0" smtClean="0"/>
+              <a:t>No </a:t>
+            </a:r>
+            <a:r>
+              <a:rPr lang="en-US" dirty="0"/>
+              <a:t>extraneous features that no one asked for.</a:t>
+            </a:r>
+          </a:p>
+          <a:p>
+            <a:pPr marL="285750" indent="-285750">
+              <a:buFont typeface="Arial" charset="0"/>
+              <a:buChar char="•"/>
+            </a:pPr>
+            <a:r>
+              <a:rPr lang="en-US" dirty="0" smtClean="0"/>
+              <a:t>Stakeholders can determine the completeness of a project by seeing how 	many features are fulfilled.</a:t>
+            </a:r>
+            <a:endParaRPr lang="en-US" dirty="0"/>
+          </a:p>
+          <a:p>
+            <a:pPr marL="285750" indent="-285750">
+              <a:buFont typeface="Arial" charset="0"/>
+              <a:buChar char="•"/>
+            </a:pPr>
+            <a:r>
+              <a:rPr lang="en-US" dirty="0" smtClean="0"/>
+              <a:t>The team has “executable requirements” to show that not only does their application do something correctly, it does the </a:t>
+            </a:r>
+            <a:r>
+              <a:rPr lang="en-US" i="1" dirty="0" smtClean="0"/>
+              <a:t>right </a:t>
+            </a:r>
+            <a:r>
+              <a:rPr lang="en-US" dirty="0" smtClean="0"/>
+              <a:t>thing correctly.</a:t>
+            </a:r>
+          </a:p>
+        </p:txBody>
+      </p:sp>
+    </p:spTree>
+    <p:extLst>
+      <p:ext uri="{BB962C8B-B14F-4D97-AF65-F5344CB8AC3E}">
+        <p14:creationId xmlns:p14="http://schemas.microsoft.com/office/powerpoint/2010/main" val="389926871"/>
+      </p:ext>
+    </p:extLst>
+  </p:cSld>
+  <p:clrMapOvr>
+    <a:masterClrMapping/>
+  </p:clrMapOvr>
+</p:sld>
+</file>
+
+<file path=ppt/slides/slide13.xml><?xml version="1.0" encoding="utf-8"?>
 <p:sld xmlns:a="http://schemas.openxmlformats.org/drawingml/2006/main" xmlns:r="http://schemas.openxmlformats.org/officeDocument/2006/relationships" xmlns:p="http://schemas.openxmlformats.org/presentationml/2006/main">
   <p:cSld>
     <p:spTree>
@@ -3876,12 +4182,33 @@
             </a:pPr>
             <a:r>
               <a:rPr lang="en-US" dirty="0"/>
-              <a:t>Behavior Driven Development (BDD) is a software development process that uses the principles of Test Driven Design (TDD) to provide the the business and technical sides of a team a shared process to create </a:t>
+              <a:t>Behavior Driven Development (BDD) is a software development </a:t>
+            </a:r>
+            <a:r>
+              <a:rPr lang="en-US" dirty="0" err="1" smtClean="0"/>
+              <a:t>processthat</a:t>
+            </a:r>
+            <a:r>
+              <a:rPr lang="en-US" dirty="0" smtClean="0"/>
+              <a:t> </a:t>
+            </a:r>
+            <a:r>
+              <a:rPr lang="en-US" dirty="0"/>
+              <a:t>uses the principles of Test Driven Design (TDD) to provide </a:t>
+            </a:r>
+            <a:r>
+              <a:rPr lang="en-US" dirty="0" smtClean="0"/>
+              <a:t>the business </a:t>
+            </a:r>
+            <a:r>
+              <a:rPr lang="en-US" dirty="0"/>
+              <a:t>and technical sides of a team a shared process to create </a:t>
             </a:r>
             <a:r>
               <a:rPr lang="en-US" dirty="0" smtClean="0"/>
               <a:t>software.</a:t>
             </a:r>
+            <a:endParaRPr lang="en-US" dirty="0"/>
           </a:p>
           <a:p>
             <a:pPr marL="342900" lvl="0" indent="-342900" defTabSz="914400" eaLnBrk="1" fontAlgn="auto" hangingPunct="1">
@@ -3897,10 +4224,10 @@
               <a:buFont typeface="Arial" charset="0"/>
               <a:buChar char="•"/>
             </a:pPr>
-            <a:endParaRPr lang="en-US" dirty="0"/>
-          </a:p>
-          <a:p>
-            <a:pPr marL="342900" lvl="0" indent="-342900" defTabSz="914400" eaLnBrk="1" fontAlgn="auto" hangingPunct="1">
+            <a:endParaRPr lang="en-US" dirty="0" smtClean="0"/>
+          </a:p>
+          <a:p>
+            <a:pPr marL="342900" indent="-342900" defTabSz="914400" eaLnBrk="1" fontAlgn="auto" hangingPunct="1">
               <a:lnSpc>
                 <a:spcPct val="100000"/>
               </a:lnSpc>
@@ -3914,8 +4241,29 @@
               <a:buChar char="•"/>
             </a:pPr>
             <a:r>
-              <a:rPr lang="en-US" dirty="0" smtClean="0"/>
-              <a:t>BDD places a heavy emphasis on collaboration between the business and technical sides of a team.</a:t>
+              <a:rPr lang="en-US" dirty="0"/>
+              <a:t>The idea of BDD </a:t>
+            </a:r>
+            <a:r>
+              <a:rPr lang="en-US" dirty="0" smtClean="0"/>
+              <a:t>is to have tests that are based completely off of the business requirements. </a:t>
+            </a:r>
+            <a:endParaRPr lang="en-US" dirty="0"/>
+          </a:p>
+          <a:p>
+            <a:pPr marL="1085850" lvl="1" indent="-342900" defTabSz="914400" eaLnBrk="1" fontAlgn="auto" hangingPunct="1">
+              <a:spcBef>
+                <a:spcPts val="0"/>
+              </a:spcBef>
+              <a:spcAft>
+                <a:spcPts val="0"/>
+              </a:spcAft>
+              <a:buFont typeface="Arial" charset="0"/>
+              <a:buChar char="•"/>
+            </a:pPr>
+            <a:r>
+              <a:rPr lang="en-US" dirty="0" smtClean="0"/>
+              <a:t>This requires close collaboration between the business and technical sides of the team, which leads to better understanding of the system for the entire team.</a:t>
             </a:r>
           </a:p>
           <a:p>
@@ -4051,11 +4399,31 @@
             </a:pPr>
             <a:r>
               <a:rPr lang="en-US" dirty="0" smtClean="0"/>
-              <a:t>Feature File – A file containing the requirements for the application. Written 	in readable </a:t>
-            </a:r>
-            <a:r>
-              <a:rPr lang="en-US" smtClean="0"/>
-              <a:t>language.</a:t>
+              <a:t>Feature File – A file containing the requirements for the application. Written 	in readable language</a:t>
+            </a:r>
+            <a:r>
+              <a:rPr lang="en-US" dirty="0" smtClean="0"/>
+              <a:t>.</a:t>
+            </a:r>
+          </a:p>
+          <a:p>
+            <a:pPr marL="285750" indent="-285750">
+              <a:buFont typeface="Arial" charset="0"/>
+              <a:buChar char="•"/>
+            </a:pPr>
+            <a:r>
+              <a:rPr lang="en-US" dirty="0" smtClean="0"/>
+              <a:t>Gherkin – a specially formatted and very readable language that feature files 	are typically written in.</a:t>
+            </a:r>
+          </a:p>
+          <a:p>
+            <a:pPr marL="1028700" lvl="1">
+              <a:buFont typeface="Arial" charset="0"/>
+              <a:buChar char="•"/>
+            </a:pPr>
+            <a:r>
+              <a:rPr lang="en-US" dirty="0" smtClean="0"/>
+              <a:t>Given, When, Then format</a:t>
             </a:r>
             <a:endParaRPr lang="en-US" dirty="0"/>
           </a:p>
@@ -4384,31 +4752,7 @@
           <a:p>
             <a:r>
               <a:rPr lang="en-US" dirty="0" smtClean="0"/>
-              <a:t>Product Manager: </a:t>
-            </a:r>
-            <a:r>
-              <a:rPr lang="en-US" dirty="0" smtClean="0"/>
-              <a:t>“I checked in the </a:t>
-            </a:r>
-            <a:r>
-              <a:rPr lang="en-US" dirty="0" smtClean="0"/>
-              <a:t>feature file with the form’s </a:t>
-            </a:r>
-            <a:r>
-              <a:rPr lang="en-US" dirty="0" smtClean="0"/>
-              <a:t>length </a:t>
-            </a:r>
-            <a:r>
-              <a:rPr lang="en-US" dirty="0" smtClean="0"/>
-              <a:t>validation </a:t>
-            </a:r>
-            <a:r>
-              <a:rPr lang="en-US" dirty="0" smtClean="0"/>
-              <a:t>	requirements</a:t>
-            </a:r>
-            <a:r>
-              <a:rPr lang="en-US" dirty="0" smtClean="0"/>
-              <a:t>.”</a:t>
+              <a:t>Product Manager: “I checked in the feature file with the form’s length validation 	requirements.”</a:t>
             </a:r>
           </a:p>
           <a:p>
@@ -4545,27 +4889,14 @@
             </a:r>
             <a:r>
               <a:rPr lang="en-US" dirty="0" smtClean="0"/>
-              <a:t>. </a:t>
-            </a:r>
-            <a:r>
-              <a:rPr lang="en-US" dirty="0" smtClean="0"/>
-              <a:t>I’ll update </a:t>
-            </a:r>
-            <a:r>
-              <a:rPr lang="en-US" dirty="0" smtClean="0"/>
-              <a:t>the feature file to 	reflect this changed requirement.”</a:t>
-            </a:r>
-          </a:p>
-          <a:p>
-            <a:r>
-              <a:rPr lang="en-US" dirty="0" smtClean="0"/>
-              <a:t>Tester: “Perfect! The test pulls in the field length value from the feature file. So 	the test </a:t>
-            </a:r>
-            <a:r>
-              <a:rPr lang="en-US" dirty="0" smtClean="0"/>
-              <a:t>doesn’t need to be modified.”</a:t>
-            </a:r>
-            <a:endParaRPr lang="en-US" dirty="0" smtClean="0"/>
+              <a:t>. I’ll update the feature file to 	reflect this changed requirement.”</a:t>
+            </a:r>
+          </a:p>
+          <a:p>
+            <a:r>
+              <a:rPr lang="en-US" dirty="0" smtClean="0"/>
+              <a:t>Tester: “Perfect! The test pulls in the field length value from the feature file. So 	the test doesn’t need to be modified.”</a:t>
+            </a:r>
           </a:p>
           <a:p>
             <a:r>
@@ -4666,7 +4997,31 @@
             </a:pPr>
             <a:r>
               <a:rPr lang="en-US" dirty="0" smtClean="0"/>
-              <a:t>In both scenarios, the team successfully covered their requirement with an automated test, but in the BDD scenario, much less time was spent updating tests. Also, a technical member of the team was not needed to update the test.</a:t>
+              <a:t>In both scenarios, the team successfully covered their requirement with an </a:t>
+            </a:r>
+            <a:r>
+              <a:rPr lang="en-US" dirty="0" smtClean="0"/>
+              <a:t>	automated </a:t>
+            </a:r>
+            <a:r>
+              <a:rPr lang="en-US" dirty="0" smtClean="0"/>
+              <a:t>test, but in the BDD scenario, much less time was spent </a:t>
+            </a:r>
+            <a:r>
+              <a:rPr lang="en-US" dirty="0" smtClean="0"/>
+              <a:t>	updating </a:t>
+            </a:r>
+            <a:r>
+              <a:rPr lang="en-US" dirty="0" smtClean="0"/>
+              <a:t>tests. Also, a technical member of the team was not needed to </a:t>
+            </a:r>
+            <a:r>
+              <a:rPr lang="en-US" dirty="0" smtClean="0"/>
+              <a:t>	update </a:t>
+            </a:r>
+            <a:r>
+              <a:rPr lang="en-US" dirty="0" smtClean="0"/>
+              <a:t>the test.</a:t>
             </a:r>
           </a:p>
           <a:p>
@@ -4676,7 +5031,31 @@
             </a:pPr>
             <a:r>
               <a:rPr lang="en-US" dirty="0" smtClean="0"/>
-              <a:t>In the BDD scenario the TDD philosophy of update the test, watch it fail, make it pass is followed. In the regular scenario the unmodified test will continue to pass until the application is updated to match the new requirement.</a:t>
+              <a:t>In the BDD scenario the TDD philosophy of update the test, watch it fail, </a:t>
+            </a:r>
+            <a:r>
+              <a:rPr lang="en-US" dirty="0" smtClean="0"/>
+              <a:t>	make </a:t>
+            </a:r>
+            <a:r>
+              <a:rPr lang="en-US" dirty="0" smtClean="0"/>
+              <a:t>it pass is followed. In the regular scenario the unmodified test will </a:t>
+            </a:r>
+            <a:r>
+              <a:rPr lang="en-US" dirty="0" smtClean="0"/>
+              <a:t>	continue </a:t>
+            </a:r>
+            <a:r>
+              <a:rPr lang="en-US" dirty="0" smtClean="0"/>
+              <a:t>to pass until the application is updated to match the new </a:t>
+            </a:r>
+            <a:r>
+              <a:rPr lang="en-US" dirty="0" smtClean="0"/>
+              <a:t>	requirement</a:t>
+            </a:r>
+            <a:r>
+              <a:rPr lang="en-US" dirty="0" smtClean="0"/>
+              <a:t>.</a:t>
             </a:r>
           </a:p>
           <a:p>
@@ -6047,6 +6426,16 @@
 </file>
 
 <file path=customXml/item2.xml><?xml version="1.0" encoding="utf-8"?>
+<LongProperties xmlns="http://schemas.microsoft.com/office/2006/metadata/longProperties"/>
+</file>
+
+<file path=customXml/item3.xml><?xml version="1.0" encoding="utf-8"?>
+<p:properties xmlns:p="http://schemas.microsoft.com/office/2006/metadata/properties" xmlns:xsi="http://www.w3.org/2001/XMLSchema-instance" xmlns:pc="http://schemas.microsoft.com/office/infopath/2007/PartnerControls">
+  <documentManagement/>
+</p:properties>
+</file>
+
+<file path=customXml/item4.xml><?xml version="1.0" encoding="utf-8"?>
 <ct:contentTypeSchema xmlns:ct="http://schemas.microsoft.com/office/2006/metadata/contentType" xmlns:ma="http://schemas.microsoft.com/office/2006/metadata/properties/metaAttributes" ct:_="" ma:_="" ma:contentTypeName="Document" ma:contentTypeID="0x01010074B7DA87A37FAC458A03F3EF817E4C75" ma:contentTypeVersion="0" ma:contentTypeDescription="Create a new document." ma:contentTypeScope="" ma:versionID="499998f85468983aa5ef8c8b6e376a2b">
   <xsd:schema xmlns:xsd="http://www.w3.org/2001/XMLSchema" xmlns:xs="http://www.w3.org/2001/XMLSchema" xmlns:p="http://schemas.microsoft.com/office/2006/metadata/properties" xmlns:ns2="037bc504-cc17-4a0d-a1f4-798ee03480e2" targetNamespace="http://schemas.microsoft.com/office/2006/metadata/properties" ma:root="true" ma:fieldsID="fae5fee81ed1579170672caf7726a2ab" ns2:_="">
     <xsd:import namespace="037bc504-cc17-4a0d-a1f4-798ee03480e2"/>
@@ -6191,23 +6580,13 @@
 </ct:contentTypeSchema>
 </file>
 
-<file path=customXml/item3.xml><?xml version="1.0" encoding="utf-8"?>
+<file path=customXml/item5.xml><?xml version="1.0" encoding="utf-8"?>
 <?mso-contentType ?>
 <FormTemplates xmlns="http://schemas.microsoft.com/sharepoint/v3/contenttype/forms">
   <Display>DocumentLibraryForm</Display>
   <Edit>DocumentLibraryForm</Edit>
   <New>DocumentLibraryForm</New>
 </FormTemplates>
-</file>
-
-<file path=customXml/item4.xml><?xml version="1.0" encoding="utf-8"?>
-<p:properties xmlns:p="http://schemas.microsoft.com/office/2006/metadata/properties" xmlns:xsi="http://www.w3.org/2001/XMLSchema-instance" xmlns:pc="http://schemas.microsoft.com/office/infopath/2007/PartnerControls">
-  <documentManagement/>
-</p:properties>
-</file>
-
-<file path=customXml/item5.xml><?xml version="1.0" encoding="utf-8"?>
-<LongProperties xmlns="http://schemas.microsoft.com/office/2006/metadata/longProperties"/>
 </file>
 
 <file path=customXml/itemProps1.xml><?xml version="1.0" encoding="utf-8"?>
@@ -6219,6 +6598,30 @@
 </file>
 
 <file path=customXml/itemProps2.xml><?xml version="1.0" encoding="utf-8"?>
+<ds:datastoreItem xmlns:ds="http://schemas.openxmlformats.org/officeDocument/2006/customXml" ds:itemID="{EA472CBF-0E5F-4633-90C8-7A000AA90F89}">
+  <ds:schemaRefs>
+    <ds:schemaRef ds:uri="http://schemas.microsoft.com/office/2006/metadata/longProperties"/>
+  </ds:schemaRefs>
+</ds:datastoreItem>
+</file>
+
+<file path=customXml/itemProps3.xml><?xml version="1.0" encoding="utf-8"?>
+<ds:datastoreItem xmlns:ds="http://schemas.openxmlformats.org/officeDocument/2006/customXml" ds:itemID="{24694BF4-419B-4B0A-A07A-48B56CDAD6BC}">
+  <ds:schemaRefs>
+    <ds:schemaRef ds:uri="http://purl.org/dc/terms/"/>
+    <ds:schemaRef ds:uri="037bc504-cc17-4a0d-a1f4-798ee03480e2"/>
+    <ds:schemaRef ds:uri="http://schemas.microsoft.com/office/2006/documentManagement/types"/>
+    <ds:schemaRef ds:uri="http://www.w3.org/XML/1998/namespace"/>
+    <ds:schemaRef ds:uri="http://purl.org/dc/dcmitype/"/>
+    <ds:schemaRef ds:uri="http://purl.org/dc/elements/1.1/"/>
+    <ds:schemaRef ds:uri="http://schemas.microsoft.com/office/2006/metadata/properties"/>
+    <ds:schemaRef ds:uri="http://schemas.microsoft.com/office/infopath/2007/PartnerControls"/>
+    <ds:schemaRef ds:uri="http://schemas.openxmlformats.org/package/2006/metadata/core-properties"/>
+  </ds:schemaRefs>
+</ds:datastoreItem>
+</file>
+
+<file path=customXml/itemProps4.xml><?xml version="1.0" encoding="utf-8"?>
 <ds:datastoreItem xmlns:ds="http://schemas.openxmlformats.org/officeDocument/2006/customXml" ds:itemID="{0EF53AE6-C797-40C6-8C0F-B44A483F93A2}">
   <ds:schemaRefs>
     <ds:schemaRef ds:uri="http://schemas.microsoft.com/office/2006/metadata/contentType"/>
@@ -6236,34 +6639,10 @@
 </ds:datastoreItem>
 </file>
 
-<file path=customXml/itemProps3.xml><?xml version="1.0" encoding="utf-8"?>
+<file path=customXml/itemProps5.xml><?xml version="1.0" encoding="utf-8"?>
 <ds:datastoreItem xmlns:ds="http://schemas.openxmlformats.org/officeDocument/2006/customXml" ds:itemID="{9C33C2F5-8CE6-4F71-8053-B7D6E0191948}">
   <ds:schemaRefs>
     <ds:schemaRef ds:uri="http://schemas.microsoft.com/sharepoint/v3/contenttype/forms"/>
   </ds:schemaRefs>
 </ds:datastoreItem>
-</file>
-
-<file path=customXml/itemProps4.xml><?xml version="1.0" encoding="utf-8"?>
-<ds:datastoreItem xmlns:ds="http://schemas.openxmlformats.org/officeDocument/2006/customXml" ds:itemID="{24694BF4-419B-4B0A-A07A-48B56CDAD6BC}">
-  <ds:schemaRefs>
-    <ds:schemaRef ds:uri="http://schemas.microsoft.com/office/2006/documentManagement/types"/>
-    <ds:schemaRef ds:uri="http://purl.org/dc/dcmitype/"/>
-    <ds:schemaRef ds:uri="037bc504-cc17-4a0d-a1f4-798ee03480e2"/>
-    <ds:schemaRef ds:uri="http://purl.org/dc/elements/1.1/"/>
-    <ds:schemaRef ds:uri="http://purl.org/dc/terms/"/>
-    <ds:schemaRef ds:uri="http://schemas.microsoft.com/office/infopath/2007/PartnerControls"/>
-    <ds:schemaRef ds:uri="http://schemas.openxmlformats.org/package/2006/metadata/core-properties"/>
-    <ds:schemaRef ds:uri="http://schemas.microsoft.com/office/2006/metadata/properties"/>
-    <ds:schemaRef ds:uri="http://www.w3.org/XML/1998/namespace"/>
-  </ds:schemaRefs>
-</ds:datastoreItem>
-</file>
-
-<file path=customXml/itemProps5.xml><?xml version="1.0" encoding="utf-8"?>
-<ds:datastoreItem xmlns:ds="http://schemas.openxmlformats.org/officeDocument/2006/customXml" ds:itemID="{EA472CBF-0E5F-4633-90C8-7A000AA90F89}">
-  <ds:schemaRefs>
-    <ds:schemaRef ds:uri="http://schemas.microsoft.com/office/2006/metadata/longProperties"/>
-  </ds:schemaRefs>
-</ds:datastoreItem>
 </file>
</xml_diff>

<commit_message>
Added animations to scenario slides.
</commit_message>
<xml_diff>
--- a/BDD.pptx
+++ b/BDD.pptx
@@ -412,7 +412,7 @@
             <a:fld id="{FEE93A03-1206-4179-8BFD-D87BEE1D9944}" type="datetimeFigureOut">
               <a:rPr lang="en-US" altLang="en-US"/>
               <a:pPr/>
-              <a:t>6/15/16</a:t>
+              <a:t>6/21/16</a:t>
             </a:fld>
             <a:endParaRPr lang="en-US" altLang="en-US"/>
           </a:p>
@@ -621,7 +621,7 @@
             <a:fld id="{23E2F853-0133-45EC-AB11-8D02543E75D3}" type="datetimeFigureOut">
               <a:rPr lang="en-US" altLang="en-US"/>
               <a:pPr/>
-              <a:t>6/15/16</a:t>
+              <a:t>6/21/16</a:t>
             </a:fld>
             <a:endParaRPr lang="en-US" altLang="en-US"/>
           </a:p>
@@ -1135,14 +1135,14 @@
           </a:ln>
           <a:extLst>
             <a:ext uri="{909E8E84-426E-40dd-AFC4-6F175D3DCCD1}">
-              <a14:hiddenFill xmlns="" xmlns:a14="http://schemas.microsoft.com/office/drawing/2010/main">
+              <a14:hiddenFill xmlns:a14="http://schemas.microsoft.com/office/drawing/2010/main" xmlns="">
                 <a:solidFill>
                   <a:srgbClr val="FFFFFF"/>
                 </a:solidFill>
               </a14:hiddenFill>
             </a:ext>
             <a:ext uri="{91240B29-F687-4f45-9708-019B960494DF}">
-              <a14:hiddenLine xmlns="" xmlns:a14="http://schemas.microsoft.com/office/drawing/2010/main" w="9525">
+              <a14:hiddenLine xmlns:a14="http://schemas.microsoft.com/office/drawing/2010/main" xmlns="" w="9525">
                 <a:solidFill>
                   <a:srgbClr val="000000"/>
                 </a:solidFill>
@@ -3579,6 +3579,235 @@
   <p:clrMapOvr>
     <a:masterClrMapping/>
   </p:clrMapOvr>
+  <p:timing>
+    <p:tnLst>
+      <p:par>
+        <p:cTn id="1" dur="indefinite" restart="never" nodeType="tmRoot">
+          <p:childTnLst>
+            <p:seq concurrent="1" nextAc="seek">
+              <p:cTn id="2" dur="indefinite" nodeType="mainSeq">
+                <p:childTnLst>
+                  <p:par>
+                    <p:cTn id="3" fill="hold">
+                      <p:stCondLst>
+                        <p:cond delay="indefinite"/>
+                      </p:stCondLst>
+                      <p:childTnLst>
+                        <p:par>
+                          <p:cTn id="4" fill="hold">
+                            <p:stCondLst>
+                              <p:cond delay="0"/>
+                            </p:stCondLst>
+                            <p:childTnLst>
+                              <p:par>
+                                <p:cTn id="5" presetID="1" presetClass="entr" presetSubtype="0" fill="hold" grpId="0" nodeType="clickEffect">
+                                  <p:stCondLst>
+                                    <p:cond delay="0"/>
+                                  </p:stCondLst>
+                                  <p:childTnLst>
+                                    <p:set>
+                                      <p:cBhvr>
+                                        <p:cTn id="6" dur="1" fill="hold">
+                                          <p:stCondLst>
+                                            <p:cond delay="0"/>
+                                          </p:stCondLst>
+                                        </p:cTn>
+                                        <p:tgtEl>
+                                          <p:spTgt spid="3">
+                                            <p:txEl>
+                                              <p:pRg st="0" end="0"/>
+                                            </p:txEl>
+                                          </p:spTgt>
+                                        </p:tgtEl>
+                                        <p:attrNameLst>
+                                          <p:attrName>style.visibility</p:attrName>
+                                        </p:attrNameLst>
+                                      </p:cBhvr>
+                                      <p:to>
+                                        <p:strVal val="visible"/>
+                                      </p:to>
+                                    </p:set>
+                                  </p:childTnLst>
+                                </p:cTn>
+                              </p:par>
+                            </p:childTnLst>
+                          </p:cTn>
+                        </p:par>
+                      </p:childTnLst>
+                    </p:cTn>
+                  </p:par>
+                  <p:par>
+                    <p:cTn id="7" fill="hold">
+                      <p:stCondLst>
+                        <p:cond delay="indefinite"/>
+                      </p:stCondLst>
+                      <p:childTnLst>
+                        <p:par>
+                          <p:cTn id="8" fill="hold">
+                            <p:stCondLst>
+                              <p:cond delay="0"/>
+                            </p:stCondLst>
+                            <p:childTnLst>
+                              <p:par>
+                                <p:cTn id="9" presetID="1" presetClass="entr" presetSubtype="0" fill="hold" grpId="0" nodeType="clickEffect">
+                                  <p:stCondLst>
+                                    <p:cond delay="0"/>
+                                  </p:stCondLst>
+                                  <p:childTnLst>
+                                    <p:set>
+                                      <p:cBhvr>
+                                        <p:cTn id="10" dur="1" fill="hold">
+                                          <p:stCondLst>
+                                            <p:cond delay="0"/>
+                                          </p:stCondLst>
+                                        </p:cTn>
+                                        <p:tgtEl>
+                                          <p:spTgt spid="3">
+                                            <p:txEl>
+                                              <p:pRg st="2" end="2"/>
+                                            </p:txEl>
+                                          </p:spTgt>
+                                        </p:tgtEl>
+                                        <p:attrNameLst>
+                                          <p:attrName>style.visibility</p:attrName>
+                                        </p:attrNameLst>
+                                      </p:cBhvr>
+                                      <p:to>
+                                        <p:strVal val="visible"/>
+                                      </p:to>
+                                    </p:set>
+                                  </p:childTnLst>
+                                </p:cTn>
+                              </p:par>
+                            </p:childTnLst>
+                          </p:cTn>
+                        </p:par>
+                      </p:childTnLst>
+                    </p:cTn>
+                  </p:par>
+                  <p:par>
+                    <p:cTn id="11" fill="hold">
+                      <p:stCondLst>
+                        <p:cond delay="indefinite"/>
+                      </p:stCondLst>
+                      <p:childTnLst>
+                        <p:par>
+                          <p:cTn id="12" fill="hold">
+                            <p:stCondLst>
+                              <p:cond delay="0"/>
+                            </p:stCondLst>
+                            <p:childTnLst>
+                              <p:par>
+                                <p:cTn id="13" presetID="1" presetClass="entr" presetSubtype="0" fill="hold" grpId="0" nodeType="clickEffect">
+                                  <p:stCondLst>
+                                    <p:cond delay="0"/>
+                                  </p:stCondLst>
+                                  <p:childTnLst>
+                                    <p:set>
+                                      <p:cBhvr>
+                                        <p:cTn id="14" dur="1" fill="hold">
+                                          <p:stCondLst>
+                                            <p:cond delay="0"/>
+                                          </p:stCondLst>
+                                        </p:cTn>
+                                        <p:tgtEl>
+                                          <p:spTgt spid="3">
+                                            <p:txEl>
+                                              <p:pRg st="3" end="3"/>
+                                            </p:txEl>
+                                          </p:spTgt>
+                                        </p:tgtEl>
+                                        <p:attrNameLst>
+                                          <p:attrName>style.visibility</p:attrName>
+                                        </p:attrNameLst>
+                                      </p:cBhvr>
+                                      <p:to>
+                                        <p:strVal val="visible"/>
+                                      </p:to>
+                                    </p:set>
+                                  </p:childTnLst>
+                                </p:cTn>
+                              </p:par>
+                            </p:childTnLst>
+                          </p:cTn>
+                        </p:par>
+                      </p:childTnLst>
+                    </p:cTn>
+                  </p:par>
+                  <p:par>
+                    <p:cTn id="15" fill="hold">
+                      <p:stCondLst>
+                        <p:cond delay="indefinite"/>
+                      </p:stCondLst>
+                      <p:childTnLst>
+                        <p:par>
+                          <p:cTn id="16" fill="hold">
+                            <p:stCondLst>
+                              <p:cond delay="0"/>
+                            </p:stCondLst>
+                            <p:childTnLst>
+                              <p:par>
+                                <p:cTn id="17" presetID="1" presetClass="entr" presetSubtype="0" fill="hold" grpId="0" nodeType="clickEffect">
+                                  <p:stCondLst>
+                                    <p:cond delay="0"/>
+                                  </p:stCondLst>
+                                  <p:childTnLst>
+                                    <p:set>
+                                      <p:cBhvr>
+                                        <p:cTn id="18" dur="1" fill="hold">
+                                          <p:stCondLst>
+                                            <p:cond delay="0"/>
+                                          </p:stCondLst>
+                                        </p:cTn>
+                                        <p:tgtEl>
+                                          <p:spTgt spid="3">
+                                            <p:txEl>
+                                              <p:pRg st="4" end="4"/>
+                                            </p:txEl>
+                                          </p:spTgt>
+                                        </p:tgtEl>
+                                        <p:attrNameLst>
+                                          <p:attrName>style.visibility</p:attrName>
+                                        </p:attrNameLst>
+                                      </p:cBhvr>
+                                      <p:to>
+                                        <p:strVal val="visible"/>
+                                      </p:to>
+                                    </p:set>
+                                  </p:childTnLst>
+                                </p:cTn>
+                              </p:par>
+                            </p:childTnLst>
+                          </p:cTn>
+                        </p:par>
+                      </p:childTnLst>
+                    </p:cTn>
+                  </p:par>
+                </p:childTnLst>
+              </p:cTn>
+              <p:prevCondLst>
+                <p:cond evt="onPrev" delay="0">
+                  <p:tgtEl>
+                    <p:sldTgt/>
+                  </p:tgtEl>
+                </p:cond>
+              </p:prevCondLst>
+              <p:nextCondLst>
+                <p:cond evt="onNext" delay="0">
+                  <p:tgtEl>
+                    <p:sldTgt/>
+                  </p:tgtEl>
+                </p:cond>
+              </p:nextCondLst>
+            </p:seq>
+          </p:childTnLst>
+        </p:cTn>
+      </p:par>
+    </p:tnLst>
+    <p:bldLst>
+      <p:bldP spid="3" grpId="0" build="p"/>
+    </p:bldLst>
+  </p:timing>
 </p:sld>
 </file>
 
@@ -3683,6 +3912,13 @@
   <p:clrMapOvr>
     <a:masterClrMapping/>
   </p:clrMapOvr>
+  <p:timing>
+    <p:tnLst>
+      <p:par>
+        <p:cTn id="1" dur="indefinite" restart="never" nodeType="tmRoot"/>
+      </p:par>
+    </p:tnLst>
+  </p:timing>
 </p:sld>
 </file>
 
@@ -4035,6 +4271,13 @@
   <p:clrMapOvr>
     <a:masterClrMapping/>
   </p:clrMapOvr>
+  <p:timing>
+    <p:tnLst>
+      <p:par>
+        <p:cTn id="1" dur="indefinite" restart="never" nodeType="tmRoot"/>
+      </p:par>
+    </p:tnLst>
+  </p:timing>
 </p:sld>
 </file>
 
@@ -4416,6 +4659,13 @@
   <p:clrMapOvr>
     <a:masterClrMapping/>
   </p:clrMapOvr>
+  <p:timing>
+    <p:tnLst>
+      <p:par>
+        <p:cTn id="1" dur="indefinite" restart="never" nodeType="tmRoot"/>
+      </p:par>
+    </p:tnLst>
+  </p:timing>
 </p:sld>
 </file>
 
@@ -4584,10 +4834,6 @@
               </a:rPr>
               <a:t>Am I testing the right thing?</a:t>
             </a:r>
-            <a:endParaRPr lang="en-US" sz="1800" dirty="0" smtClean="0">
-              <a:latin typeface="Arial"/>
-              <a:cs typeface="Arial"/>
-            </a:endParaRPr>
           </a:p>
         </p:txBody>
       </p:sp>
@@ -4620,10 +4866,6 @@
               </a:rPr>
               <a:t>Changing business logic</a:t>
             </a:r>
-            <a:endParaRPr lang="en-US" sz="1800" dirty="0" smtClean="0">
-              <a:latin typeface="Arial"/>
-              <a:cs typeface="Arial"/>
-            </a:endParaRPr>
           </a:p>
         </p:txBody>
       </p:sp>
@@ -5267,9 +5509,280 @@
   <p:timing>
     <p:tnLst>
       <p:par>
-        <p:cTn id="1" dur="indefinite" restart="never" nodeType="tmRoot"/>
+        <p:cTn id="1" dur="indefinite" restart="never" nodeType="tmRoot">
+          <p:childTnLst>
+            <p:seq concurrent="1" nextAc="seek">
+              <p:cTn id="2" dur="indefinite" nodeType="mainSeq">
+                <p:childTnLst>
+                  <p:par>
+                    <p:cTn id="3" fill="hold">
+                      <p:stCondLst>
+                        <p:cond delay="indefinite"/>
+                      </p:stCondLst>
+                      <p:childTnLst>
+                        <p:par>
+                          <p:cTn id="4" fill="hold">
+                            <p:stCondLst>
+                              <p:cond delay="0"/>
+                            </p:stCondLst>
+                            <p:childTnLst>
+                              <p:par>
+                                <p:cTn id="5" presetID="1" presetClass="entr" presetSubtype="0" fill="hold" grpId="0" nodeType="clickEffect">
+                                  <p:stCondLst>
+                                    <p:cond delay="0"/>
+                                  </p:stCondLst>
+                                  <p:childTnLst>
+                                    <p:set>
+                                      <p:cBhvr>
+                                        <p:cTn id="6" dur="1" fill="hold">
+                                          <p:stCondLst>
+                                            <p:cond delay="0"/>
+                                          </p:stCondLst>
+                                        </p:cTn>
+                                        <p:tgtEl>
+                                          <p:spTgt spid="3">
+                                            <p:txEl>
+                                              <p:pRg st="0" end="0"/>
+                                            </p:txEl>
+                                          </p:spTgt>
+                                        </p:tgtEl>
+                                        <p:attrNameLst>
+                                          <p:attrName>style.visibility</p:attrName>
+                                        </p:attrNameLst>
+                                      </p:cBhvr>
+                                      <p:to>
+                                        <p:strVal val="visible"/>
+                                      </p:to>
+                                    </p:set>
+                                  </p:childTnLst>
+                                </p:cTn>
+                              </p:par>
+                            </p:childTnLst>
+                          </p:cTn>
+                        </p:par>
+                      </p:childTnLst>
+                    </p:cTn>
+                  </p:par>
+                  <p:par>
+                    <p:cTn id="7" fill="hold">
+                      <p:stCondLst>
+                        <p:cond delay="indefinite"/>
+                      </p:stCondLst>
+                      <p:childTnLst>
+                        <p:par>
+                          <p:cTn id="8" fill="hold">
+                            <p:stCondLst>
+                              <p:cond delay="0"/>
+                            </p:stCondLst>
+                            <p:childTnLst>
+                              <p:par>
+                                <p:cTn id="9" presetID="1" presetClass="entr" presetSubtype="0" fill="hold" grpId="0" nodeType="clickEffect">
+                                  <p:stCondLst>
+                                    <p:cond delay="0"/>
+                                  </p:stCondLst>
+                                  <p:childTnLst>
+                                    <p:set>
+                                      <p:cBhvr>
+                                        <p:cTn id="10" dur="1" fill="hold">
+                                          <p:stCondLst>
+                                            <p:cond delay="0"/>
+                                          </p:stCondLst>
+                                        </p:cTn>
+                                        <p:tgtEl>
+                                          <p:spTgt spid="3">
+                                            <p:txEl>
+                                              <p:pRg st="2" end="2"/>
+                                            </p:txEl>
+                                          </p:spTgt>
+                                        </p:tgtEl>
+                                        <p:attrNameLst>
+                                          <p:attrName>style.visibility</p:attrName>
+                                        </p:attrNameLst>
+                                      </p:cBhvr>
+                                      <p:to>
+                                        <p:strVal val="visible"/>
+                                      </p:to>
+                                    </p:set>
+                                  </p:childTnLst>
+                                </p:cTn>
+                              </p:par>
+                            </p:childTnLst>
+                          </p:cTn>
+                        </p:par>
+                      </p:childTnLst>
+                    </p:cTn>
+                  </p:par>
+                  <p:par>
+                    <p:cTn id="11" fill="hold">
+                      <p:stCondLst>
+                        <p:cond delay="indefinite"/>
+                      </p:stCondLst>
+                      <p:childTnLst>
+                        <p:par>
+                          <p:cTn id="12" fill="hold">
+                            <p:stCondLst>
+                              <p:cond delay="0"/>
+                            </p:stCondLst>
+                            <p:childTnLst>
+                              <p:par>
+                                <p:cTn id="13" presetID="1" presetClass="entr" presetSubtype="0" fill="hold" grpId="0" nodeType="clickEffect">
+                                  <p:stCondLst>
+                                    <p:cond delay="0"/>
+                                  </p:stCondLst>
+                                  <p:childTnLst>
+                                    <p:set>
+                                      <p:cBhvr>
+                                        <p:cTn id="14" dur="1" fill="hold">
+                                          <p:stCondLst>
+                                            <p:cond delay="0"/>
+                                          </p:stCondLst>
+                                        </p:cTn>
+                                        <p:tgtEl>
+                                          <p:spTgt spid="3">
+                                            <p:txEl>
+                                              <p:pRg st="3" end="3"/>
+                                            </p:txEl>
+                                          </p:spTgt>
+                                        </p:tgtEl>
+                                        <p:attrNameLst>
+                                          <p:attrName>style.visibility</p:attrName>
+                                        </p:attrNameLst>
+                                      </p:cBhvr>
+                                      <p:to>
+                                        <p:strVal val="visible"/>
+                                      </p:to>
+                                    </p:set>
+                                  </p:childTnLst>
+                                </p:cTn>
+                              </p:par>
+                            </p:childTnLst>
+                          </p:cTn>
+                        </p:par>
+                      </p:childTnLst>
+                    </p:cTn>
+                  </p:par>
+                  <p:par>
+                    <p:cTn id="15" fill="hold">
+                      <p:stCondLst>
+                        <p:cond delay="indefinite"/>
+                      </p:stCondLst>
+                      <p:childTnLst>
+                        <p:par>
+                          <p:cTn id="16" fill="hold">
+                            <p:stCondLst>
+                              <p:cond delay="0"/>
+                            </p:stCondLst>
+                            <p:childTnLst>
+                              <p:par>
+                                <p:cTn id="17" presetID="1" presetClass="entr" presetSubtype="0" fill="hold" grpId="0" nodeType="clickEffect">
+                                  <p:stCondLst>
+                                    <p:cond delay="0"/>
+                                  </p:stCondLst>
+                                  <p:childTnLst>
+                                    <p:set>
+                                      <p:cBhvr>
+                                        <p:cTn id="18" dur="1" fill="hold">
+                                          <p:stCondLst>
+                                            <p:cond delay="0"/>
+                                          </p:stCondLst>
+                                        </p:cTn>
+                                        <p:tgtEl>
+                                          <p:spTgt spid="3">
+                                            <p:txEl>
+                                              <p:pRg st="4" end="4"/>
+                                            </p:txEl>
+                                          </p:spTgt>
+                                        </p:tgtEl>
+                                        <p:attrNameLst>
+                                          <p:attrName>style.visibility</p:attrName>
+                                        </p:attrNameLst>
+                                      </p:cBhvr>
+                                      <p:to>
+                                        <p:strVal val="visible"/>
+                                      </p:to>
+                                    </p:set>
+                                  </p:childTnLst>
+                                </p:cTn>
+                              </p:par>
+                            </p:childTnLst>
+                          </p:cTn>
+                        </p:par>
+                      </p:childTnLst>
+                    </p:cTn>
+                  </p:par>
+                  <p:par>
+                    <p:cTn id="19" fill="hold">
+                      <p:stCondLst>
+                        <p:cond delay="indefinite"/>
+                      </p:stCondLst>
+                      <p:childTnLst>
+                        <p:par>
+                          <p:cTn id="20" fill="hold">
+                            <p:stCondLst>
+                              <p:cond delay="0"/>
+                            </p:stCondLst>
+                            <p:childTnLst>
+                              <p:par>
+                                <p:cTn id="21" presetID="1" presetClass="entr" presetSubtype="0" fill="hold" grpId="0" nodeType="clickEffect">
+                                  <p:stCondLst>
+                                    <p:cond delay="0"/>
+                                  </p:stCondLst>
+                                  <p:childTnLst>
+                                    <p:set>
+                                      <p:cBhvr>
+                                        <p:cTn id="22" dur="1" fill="hold">
+                                          <p:stCondLst>
+                                            <p:cond delay="0"/>
+                                          </p:stCondLst>
+                                        </p:cTn>
+                                        <p:tgtEl>
+                                          <p:spTgt spid="3">
+                                            <p:txEl>
+                                              <p:pRg st="6" end="6"/>
+                                            </p:txEl>
+                                          </p:spTgt>
+                                        </p:tgtEl>
+                                        <p:attrNameLst>
+                                          <p:attrName>style.visibility</p:attrName>
+                                        </p:attrNameLst>
+                                      </p:cBhvr>
+                                      <p:to>
+                                        <p:strVal val="visible"/>
+                                      </p:to>
+                                    </p:set>
+                                  </p:childTnLst>
+                                </p:cTn>
+                              </p:par>
+                            </p:childTnLst>
+                          </p:cTn>
+                        </p:par>
+                      </p:childTnLst>
+                    </p:cTn>
+                  </p:par>
+                </p:childTnLst>
+              </p:cTn>
+              <p:prevCondLst>
+                <p:cond evt="onPrev" delay="0">
+                  <p:tgtEl>
+                    <p:sldTgt/>
+                  </p:tgtEl>
+                </p:cond>
+              </p:prevCondLst>
+              <p:nextCondLst>
+                <p:cond evt="onNext" delay="0">
+                  <p:tgtEl>
+                    <p:sldTgt/>
+                  </p:tgtEl>
+                </p:cond>
+              </p:nextCondLst>
+            </p:seq>
+          </p:childTnLst>
+        </p:cTn>
       </p:par>
     </p:tnLst>
+    <p:bldLst>
+      <p:bldP spid="3" grpId="0" uiExpand="1" build="p"/>
+    </p:bldLst>
   </p:timing>
 </p:sld>
 </file>
@@ -5386,9 +5899,231 @@
   <p:timing>
     <p:tnLst>
       <p:par>
-        <p:cTn id="1" dur="indefinite" restart="never" nodeType="tmRoot"/>
+        <p:cTn id="1" dur="indefinite" restart="never" nodeType="tmRoot">
+          <p:childTnLst>
+            <p:seq concurrent="1" nextAc="seek">
+              <p:cTn id="2" dur="indefinite" nodeType="mainSeq">
+                <p:childTnLst>
+                  <p:par>
+                    <p:cTn id="3" fill="hold">
+                      <p:stCondLst>
+                        <p:cond delay="indefinite"/>
+                      </p:stCondLst>
+                      <p:childTnLst>
+                        <p:par>
+                          <p:cTn id="4" fill="hold">
+                            <p:stCondLst>
+                              <p:cond delay="0"/>
+                            </p:stCondLst>
+                            <p:childTnLst>
+                              <p:par>
+                                <p:cTn id="5" presetID="1" presetClass="entr" presetSubtype="0" fill="hold" grpId="0" nodeType="clickEffect">
+                                  <p:stCondLst>
+                                    <p:cond delay="0"/>
+                                  </p:stCondLst>
+                                  <p:childTnLst>
+                                    <p:set>
+                                      <p:cBhvr>
+                                        <p:cTn id="6" dur="1" fill="hold">
+                                          <p:stCondLst>
+                                            <p:cond delay="0"/>
+                                          </p:stCondLst>
+                                        </p:cTn>
+                                        <p:tgtEl>
+                                          <p:spTgt spid="3">
+                                            <p:txEl>
+                                              <p:pRg st="0" end="0"/>
+                                            </p:txEl>
+                                          </p:spTgt>
+                                        </p:tgtEl>
+                                        <p:attrNameLst>
+                                          <p:attrName>style.visibility</p:attrName>
+                                        </p:attrNameLst>
+                                      </p:cBhvr>
+                                      <p:to>
+                                        <p:strVal val="visible"/>
+                                      </p:to>
+                                    </p:set>
+                                  </p:childTnLst>
+                                </p:cTn>
+                              </p:par>
+                            </p:childTnLst>
+                          </p:cTn>
+                        </p:par>
+                      </p:childTnLst>
+                    </p:cTn>
+                  </p:par>
+                  <p:par>
+                    <p:cTn id="7" fill="hold">
+                      <p:stCondLst>
+                        <p:cond delay="indefinite"/>
+                      </p:stCondLst>
+                      <p:childTnLst>
+                        <p:par>
+                          <p:cTn id="8" fill="hold">
+                            <p:stCondLst>
+                              <p:cond delay="0"/>
+                            </p:stCondLst>
+                            <p:childTnLst>
+                              <p:par>
+                                <p:cTn id="9" presetID="1" presetClass="entr" presetSubtype="0" fill="hold" grpId="0" nodeType="clickEffect">
+                                  <p:stCondLst>
+                                    <p:cond delay="0"/>
+                                  </p:stCondLst>
+                                  <p:childTnLst>
+                                    <p:set>
+                                      <p:cBhvr>
+                                        <p:cTn id="10" dur="1" fill="hold">
+                                          <p:stCondLst>
+                                            <p:cond delay="0"/>
+                                          </p:stCondLst>
+                                        </p:cTn>
+                                        <p:tgtEl>
+                                          <p:spTgt spid="3">
+                                            <p:txEl>
+                                              <p:pRg st="2" end="2"/>
+                                            </p:txEl>
+                                          </p:spTgt>
+                                        </p:tgtEl>
+                                        <p:attrNameLst>
+                                          <p:attrName>style.visibility</p:attrName>
+                                        </p:attrNameLst>
+                                      </p:cBhvr>
+                                      <p:to>
+                                        <p:strVal val="visible"/>
+                                      </p:to>
+                                    </p:set>
+                                  </p:childTnLst>
+                                </p:cTn>
+                              </p:par>
+                            </p:childTnLst>
+                          </p:cTn>
+                        </p:par>
+                      </p:childTnLst>
+                    </p:cTn>
+                  </p:par>
+                  <p:par>
+                    <p:cTn id="11" fill="hold">
+                      <p:stCondLst>
+                        <p:cond delay="indefinite"/>
+                      </p:stCondLst>
+                      <p:childTnLst>
+                        <p:par>
+                          <p:cTn id="12" fill="hold">
+                            <p:stCondLst>
+                              <p:cond delay="0"/>
+                            </p:stCondLst>
+                            <p:childTnLst>
+                              <p:par>
+                                <p:cTn id="13" presetID="1" presetClass="entr" presetSubtype="0" fill="hold" grpId="0" nodeType="clickEffect">
+                                  <p:stCondLst>
+                                    <p:cond delay="0"/>
+                                  </p:stCondLst>
+                                  <p:childTnLst>
+                                    <p:set>
+                                      <p:cBhvr>
+                                        <p:cTn id="14" dur="1" fill="hold">
+                                          <p:stCondLst>
+                                            <p:cond delay="0"/>
+                                          </p:stCondLst>
+                                        </p:cTn>
+                                        <p:tgtEl>
+                                          <p:spTgt spid="3">
+                                            <p:txEl>
+                                              <p:pRg st="3" end="3"/>
+                                            </p:txEl>
+                                          </p:spTgt>
+                                        </p:tgtEl>
+                                        <p:attrNameLst>
+                                          <p:attrName>style.visibility</p:attrName>
+                                        </p:attrNameLst>
+                                      </p:cBhvr>
+                                      <p:to>
+                                        <p:strVal val="visible"/>
+                                      </p:to>
+                                    </p:set>
+                                  </p:childTnLst>
+                                </p:cTn>
+                              </p:par>
+                            </p:childTnLst>
+                          </p:cTn>
+                        </p:par>
+                      </p:childTnLst>
+                    </p:cTn>
+                  </p:par>
+                  <p:par>
+                    <p:cTn id="15" fill="hold">
+                      <p:stCondLst>
+                        <p:cond delay="indefinite"/>
+                      </p:stCondLst>
+                      <p:childTnLst>
+                        <p:par>
+                          <p:cTn id="16" fill="hold">
+                            <p:stCondLst>
+                              <p:cond delay="0"/>
+                            </p:stCondLst>
+                            <p:childTnLst>
+                              <p:par>
+                                <p:cTn id="17" presetID="1" presetClass="entr" presetSubtype="0" fill="hold" grpId="0" nodeType="clickEffect">
+                                  <p:stCondLst>
+                                    <p:cond delay="0"/>
+                                  </p:stCondLst>
+                                  <p:childTnLst>
+                                    <p:set>
+                                      <p:cBhvr>
+                                        <p:cTn id="18" dur="1" fill="hold">
+                                          <p:stCondLst>
+                                            <p:cond delay="0"/>
+                                          </p:stCondLst>
+                                        </p:cTn>
+                                        <p:tgtEl>
+                                          <p:spTgt spid="3">
+                                            <p:txEl>
+                                              <p:pRg st="4" end="4"/>
+                                            </p:txEl>
+                                          </p:spTgt>
+                                        </p:tgtEl>
+                                        <p:attrNameLst>
+                                          <p:attrName>style.visibility</p:attrName>
+                                        </p:attrNameLst>
+                                      </p:cBhvr>
+                                      <p:to>
+                                        <p:strVal val="visible"/>
+                                      </p:to>
+                                    </p:set>
+                                  </p:childTnLst>
+                                </p:cTn>
+                              </p:par>
+                            </p:childTnLst>
+                          </p:cTn>
+                        </p:par>
+                      </p:childTnLst>
+                    </p:cTn>
+                  </p:par>
+                </p:childTnLst>
+              </p:cTn>
+              <p:prevCondLst>
+                <p:cond evt="onPrev" delay="0">
+                  <p:tgtEl>
+                    <p:sldTgt/>
+                  </p:tgtEl>
+                </p:cond>
+              </p:prevCondLst>
+              <p:nextCondLst>
+                <p:cond evt="onNext" delay="0">
+                  <p:tgtEl>
+                    <p:sldTgt/>
+                  </p:tgtEl>
+                </p:cond>
+              </p:nextCondLst>
+            </p:seq>
+          </p:childTnLst>
+        </p:cTn>
       </p:par>
     </p:tnLst>
+    <p:bldLst>
+      <p:bldP spid="3" grpId="0" build="p"/>
+    </p:bldLst>
   </p:timing>
 </p:sld>
 </file>
@@ -5523,6 +6258,284 @@
   <p:clrMapOvr>
     <a:masterClrMapping/>
   </p:clrMapOvr>
+  <p:timing>
+    <p:tnLst>
+      <p:par>
+        <p:cTn id="1" dur="indefinite" restart="never" nodeType="tmRoot">
+          <p:childTnLst>
+            <p:seq concurrent="1" nextAc="seek">
+              <p:cTn id="2" dur="indefinite" nodeType="mainSeq">
+                <p:childTnLst>
+                  <p:par>
+                    <p:cTn id="3" fill="hold">
+                      <p:stCondLst>
+                        <p:cond delay="indefinite"/>
+                      </p:stCondLst>
+                      <p:childTnLst>
+                        <p:par>
+                          <p:cTn id="4" fill="hold">
+                            <p:stCondLst>
+                              <p:cond delay="0"/>
+                            </p:stCondLst>
+                            <p:childTnLst>
+                              <p:par>
+                                <p:cTn id="5" presetID="1" presetClass="entr" presetSubtype="0" fill="hold" grpId="0" nodeType="clickEffect">
+                                  <p:stCondLst>
+                                    <p:cond delay="0"/>
+                                  </p:stCondLst>
+                                  <p:childTnLst>
+                                    <p:set>
+                                      <p:cBhvr>
+                                        <p:cTn id="6" dur="1" fill="hold">
+                                          <p:stCondLst>
+                                            <p:cond delay="0"/>
+                                          </p:stCondLst>
+                                        </p:cTn>
+                                        <p:tgtEl>
+                                          <p:spTgt spid="3">
+                                            <p:txEl>
+                                              <p:pRg st="0" end="0"/>
+                                            </p:txEl>
+                                          </p:spTgt>
+                                        </p:tgtEl>
+                                        <p:attrNameLst>
+                                          <p:attrName>style.visibility</p:attrName>
+                                        </p:attrNameLst>
+                                      </p:cBhvr>
+                                      <p:to>
+                                        <p:strVal val="visible"/>
+                                      </p:to>
+                                    </p:set>
+                                  </p:childTnLst>
+                                </p:cTn>
+                              </p:par>
+                            </p:childTnLst>
+                          </p:cTn>
+                        </p:par>
+                      </p:childTnLst>
+                    </p:cTn>
+                  </p:par>
+                  <p:par>
+                    <p:cTn id="7" fill="hold">
+                      <p:stCondLst>
+                        <p:cond delay="indefinite"/>
+                      </p:stCondLst>
+                      <p:childTnLst>
+                        <p:par>
+                          <p:cTn id="8" fill="hold">
+                            <p:stCondLst>
+                              <p:cond delay="0"/>
+                            </p:stCondLst>
+                            <p:childTnLst>
+                              <p:par>
+                                <p:cTn id="9" presetID="1" presetClass="entr" presetSubtype="0" fill="hold" grpId="0" nodeType="clickEffect">
+                                  <p:stCondLst>
+                                    <p:cond delay="0"/>
+                                  </p:stCondLst>
+                                  <p:childTnLst>
+                                    <p:set>
+                                      <p:cBhvr>
+                                        <p:cTn id="10" dur="1" fill="hold">
+                                          <p:stCondLst>
+                                            <p:cond delay="0"/>
+                                          </p:stCondLst>
+                                        </p:cTn>
+                                        <p:tgtEl>
+                                          <p:spTgt spid="3">
+                                            <p:txEl>
+                                              <p:pRg st="2" end="2"/>
+                                            </p:txEl>
+                                          </p:spTgt>
+                                        </p:tgtEl>
+                                        <p:attrNameLst>
+                                          <p:attrName>style.visibility</p:attrName>
+                                        </p:attrNameLst>
+                                      </p:cBhvr>
+                                      <p:to>
+                                        <p:strVal val="visible"/>
+                                      </p:to>
+                                    </p:set>
+                                  </p:childTnLst>
+                                </p:cTn>
+                              </p:par>
+                            </p:childTnLst>
+                          </p:cTn>
+                        </p:par>
+                      </p:childTnLst>
+                    </p:cTn>
+                  </p:par>
+                  <p:par>
+                    <p:cTn id="11" fill="hold">
+                      <p:stCondLst>
+                        <p:cond delay="indefinite"/>
+                      </p:stCondLst>
+                      <p:childTnLst>
+                        <p:par>
+                          <p:cTn id="12" fill="hold">
+                            <p:stCondLst>
+                              <p:cond delay="0"/>
+                            </p:stCondLst>
+                            <p:childTnLst>
+                              <p:par>
+                                <p:cTn id="13" presetID="1" presetClass="entr" presetSubtype="0" fill="hold" grpId="0" nodeType="clickEffect">
+                                  <p:stCondLst>
+                                    <p:cond delay="0"/>
+                                  </p:stCondLst>
+                                  <p:childTnLst>
+                                    <p:set>
+                                      <p:cBhvr>
+                                        <p:cTn id="14" dur="1" fill="hold">
+                                          <p:stCondLst>
+                                            <p:cond delay="0"/>
+                                          </p:stCondLst>
+                                        </p:cTn>
+                                        <p:tgtEl>
+                                          <p:spTgt spid="3">
+                                            <p:txEl>
+                                              <p:pRg st="3" end="3"/>
+                                            </p:txEl>
+                                          </p:spTgt>
+                                        </p:tgtEl>
+                                        <p:attrNameLst>
+                                          <p:attrName>style.visibility</p:attrName>
+                                        </p:attrNameLst>
+                                      </p:cBhvr>
+                                      <p:to>
+                                        <p:strVal val="visible"/>
+                                      </p:to>
+                                    </p:set>
+                                  </p:childTnLst>
+                                </p:cTn>
+                              </p:par>
+                            </p:childTnLst>
+                          </p:cTn>
+                        </p:par>
+                      </p:childTnLst>
+                    </p:cTn>
+                  </p:par>
+                  <p:par>
+                    <p:cTn id="15" fill="hold">
+                      <p:stCondLst>
+                        <p:cond delay="indefinite"/>
+                      </p:stCondLst>
+                      <p:childTnLst>
+                        <p:par>
+                          <p:cTn id="16" fill="hold">
+                            <p:stCondLst>
+                              <p:cond delay="0"/>
+                            </p:stCondLst>
+                            <p:childTnLst>
+                              <p:par>
+                                <p:cTn id="17" presetID="1" presetClass="entr" presetSubtype="0" fill="hold" grpId="0" nodeType="clickEffect">
+                                  <p:stCondLst>
+                                    <p:cond delay="0"/>
+                                  </p:stCondLst>
+                                  <p:childTnLst>
+                                    <p:set>
+                                      <p:cBhvr>
+                                        <p:cTn id="18" dur="1" fill="hold">
+                                          <p:stCondLst>
+                                            <p:cond delay="0"/>
+                                          </p:stCondLst>
+                                        </p:cTn>
+                                        <p:tgtEl>
+                                          <p:spTgt spid="3">
+                                            <p:txEl>
+                                              <p:pRg st="4" end="4"/>
+                                            </p:txEl>
+                                          </p:spTgt>
+                                        </p:tgtEl>
+                                        <p:attrNameLst>
+                                          <p:attrName>style.visibility</p:attrName>
+                                        </p:attrNameLst>
+                                      </p:cBhvr>
+                                      <p:to>
+                                        <p:strVal val="visible"/>
+                                      </p:to>
+                                    </p:set>
+                                  </p:childTnLst>
+                                </p:cTn>
+                              </p:par>
+                            </p:childTnLst>
+                          </p:cTn>
+                        </p:par>
+                      </p:childTnLst>
+                    </p:cTn>
+                  </p:par>
+                  <p:par>
+                    <p:cTn id="19" fill="hold">
+                      <p:stCondLst>
+                        <p:cond delay="indefinite"/>
+                      </p:stCondLst>
+                      <p:childTnLst>
+                        <p:par>
+                          <p:cTn id="20" fill="hold">
+                            <p:stCondLst>
+                              <p:cond delay="0"/>
+                            </p:stCondLst>
+                            <p:childTnLst>
+                              <p:par>
+                                <p:cTn id="21" presetID="1" presetClass="entr" presetSubtype="0" fill="hold" grpId="0" nodeType="clickEffect">
+                                  <p:stCondLst>
+                                    <p:cond delay="0"/>
+                                  </p:stCondLst>
+                                  <p:childTnLst>
+                                    <p:set>
+                                      <p:cBhvr>
+                                        <p:cTn id="22" dur="1" fill="hold">
+                                          <p:stCondLst>
+                                            <p:cond delay="0"/>
+                                          </p:stCondLst>
+                                        </p:cTn>
+                                        <p:tgtEl>
+                                          <p:spTgt spid="3">
+                                            <p:txEl>
+                                              <p:pRg st="6" end="6"/>
+                                            </p:txEl>
+                                          </p:spTgt>
+                                        </p:tgtEl>
+                                        <p:attrNameLst>
+                                          <p:attrName>style.visibility</p:attrName>
+                                        </p:attrNameLst>
+                                      </p:cBhvr>
+                                      <p:to>
+                                        <p:strVal val="visible"/>
+                                      </p:to>
+                                    </p:set>
+                                  </p:childTnLst>
+                                </p:cTn>
+                              </p:par>
+                            </p:childTnLst>
+                          </p:cTn>
+                        </p:par>
+                      </p:childTnLst>
+                    </p:cTn>
+                  </p:par>
+                </p:childTnLst>
+              </p:cTn>
+              <p:prevCondLst>
+                <p:cond evt="onPrev" delay="0">
+                  <p:tgtEl>
+                    <p:sldTgt/>
+                  </p:tgtEl>
+                </p:cond>
+              </p:prevCondLst>
+              <p:nextCondLst>
+                <p:cond evt="onNext" delay="0">
+                  <p:tgtEl>
+                    <p:sldTgt/>
+                  </p:tgtEl>
+                </p:cond>
+              </p:nextCondLst>
+            </p:seq>
+          </p:childTnLst>
+        </p:cTn>
+      </p:par>
+    </p:tnLst>
+    <p:bldLst>
+      <p:bldP spid="3" grpId="0" build="p"/>
+    </p:bldLst>
+  </p:timing>
 </p:sld>
 </file>
 

</xml_diff>

<commit_message>
Added 'More Info on Cucumber' slide.
</commit_message>
<xml_diff>
--- a/BDD.pptx
+++ b/BDD.pptx
@@ -6,10 +6,10 @@
     <p:sldMasterId id="2147483697" r:id="rId7"/>
   </p:sldMasterIdLst>
   <p:notesMasterIdLst>
-    <p:notesMasterId r:id="rId23"/>
+    <p:notesMasterId r:id="rId24"/>
   </p:notesMasterIdLst>
   <p:handoutMasterIdLst>
-    <p:handoutMasterId r:id="rId24"/>
+    <p:handoutMasterId r:id="rId25"/>
   </p:handoutMasterIdLst>
   <p:sldIdLst>
     <p:sldId id="264" r:id="rId8"/>
@@ -26,7 +26,8 @@
     <p:sldId id="273" r:id="rId19"/>
     <p:sldId id="274" r:id="rId20"/>
     <p:sldId id="276" r:id="rId21"/>
-    <p:sldId id="275" r:id="rId22"/>
+    <p:sldId id="279" r:id="rId22"/>
+    <p:sldId id="275" r:id="rId23"/>
   </p:sldIdLst>
   <p:sldSz cx="9144000" cy="6858000" type="screen4x3"/>
   <p:notesSz cx="7010400" cy="9296400"/>
@@ -412,7 +413,7 @@
             <a:fld id="{FEE93A03-1206-4179-8BFD-D87BEE1D9944}" type="datetimeFigureOut">
               <a:rPr lang="en-US" altLang="en-US"/>
               <a:pPr/>
-              <a:t>6/21/16</a:t>
+              <a:t>6/22/16</a:t>
             </a:fld>
             <a:endParaRPr lang="en-US" altLang="en-US"/>
           </a:p>
@@ -621,7 +622,7 @@
             <a:fld id="{23E2F853-0133-45EC-AB11-8D02543E75D3}" type="datetimeFigureOut">
               <a:rPr lang="en-US" altLang="en-US"/>
               <a:pPr/>
-              <a:t>6/21/16</a:t>
+              <a:t>6/22/16</a:t>
             </a:fld>
             <a:endParaRPr lang="en-US" altLang="en-US"/>
           </a:p>
@@ -1135,14 +1136,14 @@
           </a:ln>
           <a:extLst>
             <a:ext uri="{909E8E84-426E-40dd-AFC4-6F175D3DCCD1}">
-              <a14:hiddenFill xmlns:a14="http://schemas.microsoft.com/office/drawing/2010/main" xmlns="">
+              <a14:hiddenFill xmlns="" xmlns:a14="http://schemas.microsoft.com/office/drawing/2010/main">
                 <a:solidFill>
                   <a:srgbClr val="FFFFFF"/>
                 </a:solidFill>
               </a14:hiddenFill>
             </a:ext>
             <a:ext uri="{91240B29-F687-4f45-9708-019B960494DF}">
-              <a14:hiddenLine xmlns:a14="http://schemas.microsoft.com/office/drawing/2010/main" xmlns="" w="9525">
+              <a14:hiddenLine xmlns="" xmlns:a14="http://schemas.microsoft.com/office/drawing/2010/main" w="9525">
                 <a:solidFill>
                   <a:srgbClr val="000000"/>
                 </a:solidFill>
@@ -4256,7 +4257,21 @@
             </a:r>
             <a:r>
               <a:rPr lang="en-US" dirty="0" smtClean="0"/>
-              <a:t>thing correctly.</a:t>
+              <a:t>thing correctly</a:t>
+            </a:r>
+            <a:r>
+              <a:rPr lang="en-US" dirty="0" smtClean="0"/>
+              <a:t>.</a:t>
+            </a:r>
+          </a:p>
+          <a:p>
+            <a:pPr marL="285750" indent="-285750">
+              <a:buFont typeface="Arial" charset="0"/>
+              <a:buChar char="•"/>
+            </a:pPr>
+            <a:r>
+              <a:rPr lang="en-US" dirty="0" smtClean="0"/>
+              <a:t>Built in Requirements Traceability </a:t>
             </a:r>
           </a:p>
         </p:txBody>
@@ -4282,6 +4297,140 @@
 </file>
 
 <file path=ppt/slides/slide15.xml><?xml version="1.0" encoding="utf-8"?>
+<p:sld xmlns:a="http://schemas.openxmlformats.org/drawingml/2006/main" xmlns:r="http://schemas.openxmlformats.org/officeDocument/2006/relationships" xmlns:p="http://schemas.openxmlformats.org/presentationml/2006/main">
+  <p:cSld>
+    <p:spTree>
+      <p:nvGrpSpPr>
+        <p:cNvPr id="1" name=""/>
+        <p:cNvGrpSpPr/>
+        <p:nvPr/>
+      </p:nvGrpSpPr>
+      <p:grpSpPr>
+        <a:xfrm>
+          <a:off x="0" y="0"/>
+          <a:ext cx="0" cy="0"/>
+          <a:chOff x="0" y="0"/>
+          <a:chExt cx="0" cy="0"/>
+        </a:xfrm>
+      </p:grpSpPr>
+      <p:sp>
+        <p:nvSpPr>
+          <p:cNvPr id="2" name="Title 1"/>
+          <p:cNvSpPr>
+            <a:spLocks noGrp="1"/>
+          </p:cNvSpPr>
+          <p:nvPr>
+            <p:ph type="title"/>
+          </p:nvPr>
+        </p:nvSpPr>
+        <p:spPr/>
+        <p:txBody>
+          <a:bodyPr/>
+          <a:lstStyle/>
+          <a:p>
+            <a:r>
+              <a:rPr lang="en-US" dirty="0" smtClean="0"/>
+              <a:t>More Information on Cucumber</a:t>
+            </a:r>
+            <a:endParaRPr lang="en-US" dirty="0"/>
+          </a:p>
+        </p:txBody>
+      </p:sp>
+      <p:sp>
+        <p:nvSpPr>
+          <p:cNvPr id="3" name="Text Placeholder 2"/>
+          <p:cNvSpPr>
+            <a:spLocks noGrp="1"/>
+          </p:cNvSpPr>
+          <p:nvPr>
+            <p:ph type="body" sz="quarter" idx="12"/>
+          </p:nvPr>
+        </p:nvSpPr>
+        <p:spPr>
+          <a:xfrm>
+            <a:off x="457200" y="1366179"/>
+            <a:ext cx="8229600" cy="4652235"/>
+          </a:xfrm>
+        </p:spPr>
+        <p:txBody>
+          <a:bodyPr/>
+          <a:lstStyle/>
+          <a:p>
+            <a:pPr marL="285750">
+              <a:buFont typeface="Arial" charset="0"/>
+              <a:buChar char="•"/>
+            </a:pPr>
+            <a:r>
+              <a:rPr lang="en-US" dirty="0" smtClean="0"/>
+              <a:t> Cucumber Documentation</a:t>
+            </a:r>
+          </a:p>
+          <a:p>
+            <a:pPr marL="1028700" lvl="1">
+              <a:buFont typeface="Arial" charset="0"/>
+              <a:buChar char="•"/>
+            </a:pPr>
+            <a:r>
+              <a:rPr lang="en-US" dirty="0">
+                <a:hlinkClick r:id="rId2"/>
+              </a:rPr>
+              <a:t>https://</a:t>
+            </a:r>
+            <a:r>
+              <a:rPr lang="en-US" dirty="0" smtClean="0">
+                <a:hlinkClick r:id="rId2"/>
+              </a:rPr>
+              <a:t>cucumber.io/docs</a:t>
+            </a:r>
+            <a:endParaRPr lang="en-US" dirty="0" smtClean="0"/>
+          </a:p>
+          <a:p>
+            <a:pPr marL="285750">
+              <a:buFont typeface="Arial" charset="0"/>
+              <a:buChar char="•"/>
+            </a:pPr>
+            <a:r>
+              <a:rPr lang="en-US" dirty="0"/>
+              <a:t> </a:t>
+            </a:r>
+            <a:r>
+              <a:rPr lang="en-US" dirty="0" smtClean="0"/>
+              <a:t>The Cucumber Book: BDD for Testers and Developers</a:t>
+            </a:r>
+          </a:p>
+          <a:p>
+            <a:pPr marL="1028700" lvl="1">
+              <a:buFont typeface="Arial" charset="0"/>
+              <a:buChar char="•"/>
+            </a:pPr>
+            <a:r>
+              <a:rPr lang="en-US" dirty="0" smtClean="0"/>
+              <a:t>ISBN: 978-1-93435-680-7</a:t>
+            </a:r>
+          </a:p>
+          <a:p>
+            <a:pPr marL="1028700" lvl="1">
+              <a:buFont typeface="Arial" charset="0"/>
+              <a:buChar char="•"/>
+            </a:pPr>
+            <a:endParaRPr lang="en-US" dirty="0"/>
+          </a:p>
+        </p:txBody>
+      </p:sp>
+    </p:spTree>
+    <p:extLst>
+      <p:ext uri="{BB962C8B-B14F-4D97-AF65-F5344CB8AC3E}">
+        <p14:creationId xmlns:p14="http://schemas.microsoft.com/office/powerpoint/2010/main" val="1303975052"/>
+      </p:ext>
+    </p:extLst>
+  </p:cSld>
+  <p:clrMapOvr>
+    <a:masterClrMapping/>
+  </p:clrMapOvr>
+</p:sld>
+</file>
+
+<file path=ppt/slides/slide16.xml><?xml version="1.0" encoding="utf-8"?>
 <p:sld xmlns:a="http://schemas.openxmlformats.org/drawingml/2006/main" xmlns:r="http://schemas.openxmlformats.org/officeDocument/2006/relationships" xmlns:p="http://schemas.openxmlformats.org/presentationml/2006/main">
   <p:cSld>
     <p:spTree>

</xml_diff>